<commit_message>
changed layout of index.html
updated with new theme to website
</commit_message>
<xml_diff>
--- a/portfolio_img/portfolio.pptx
+++ b/portfolio_img/portfolio.pptx
@@ -248,7 +248,7 @@
           <a:p>
             <a:fld id="{3B638056-2271-4463-BAE1-4AC5602DC725}" type="datetimeFigureOut">
               <a:rPr lang="en-US" smtClean="0"/>
-              <a:t>12/30/2015</a:t>
+              <a:t>1/2/2016</a:t>
             </a:fld>
             <a:endParaRPr lang="en-US"/>
           </a:p>
@@ -418,7 +418,7 @@
           <a:p>
             <a:fld id="{3B638056-2271-4463-BAE1-4AC5602DC725}" type="datetimeFigureOut">
               <a:rPr lang="en-US" smtClean="0"/>
-              <a:t>12/30/2015</a:t>
+              <a:t>1/2/2016</a:t>
             </a:fld>
             <a:endParaRPr lang="en-US"/>
           </a:p>
@@ -598,7 +598,7 @@
           <a:p>
             <a:fld id="{3B638056-2271-4463-BAE1-4AC5602DC725}" type="datetimeFigureOut">
               <a:rPr lang="en-US" smtClean="0"/>
-              <a:t>12/30/2015</a:t>
+              <a:t>1/2/2016</a:t>
             </a:fld>
             <a:endParaRPr lang="en-US"/>
           </a:p>
@@ -768,7 +768,7 @@
           <a:p>
             <a:fld id="{3B638056-2271-4463-BAE1-4AC5602DC725}" type="datetimeFigureOut">
               <a:rPr lang="en-US" smtClean="0"/>
-              <a:t>12/30/2015</a:t>
+              <a:t>1/2/2016</a:t>
             </a:fld>
             <a:endParaRPr lang="en-US"/>
           </a:p>
@@ -1014,7 +1014,7 @@
           <a:p>
             <a:fld id="{3B638056-2271-4463-BAE1-4AC5602DC725}" type="datetimeFigureOut">
               <a:rPr lang="en-US" smtClean="0"/>
-              <a:t>12/30/2015</a:t>
+              <a:t>1/2/2016</a:t>
             </a:fld>
             <a:endParaRPr lang="en-US"/>
           </a:p>
@@ -1246,7 +1246,7 @@
           <a:p>
             <a:fld id="{3B638056-2271-4463-BAE1-4AC5602DC725}" type="datetimeFigureOut">
               <a:rPr lang="en-US" smtClean="0"/>
-              <a:t>12/30/2015</a:t>
+              <a:t>1/2/2016</a:t>
             </a:fld>
             <a:endParaRPr lang="en-US"/>
           </a:p>
@@ -1613,7 +1613,7 @@
           <a:p>
             <a:fld id="{3B638056-2271-4463-BAE1-4AC5602DC725}" type="datetimeFigureOut">
               <a:rPr lang="en-US" smtClean="0"/>
-              <a:t>12/30/2015</a:t>
+              <a:t>1/2/2016</a:t>
             </a:fld>
             <a:endParaRPr lang="en-US"/>
           </a:p>
@@ -1731,7 +1731,7 @@
           <a:p>
             <a:fld id="{3B638056-2271-4463-BAE1-4AC5602DC725}" type="datetimeFigureOut">
               <a:rPr lang="en-US" smtClean="0"/>
-              <a:t>12/30/2015</a:t>
+              <a:t>1/2/2016</a:t>
             </a:fld>
             <a:endParaRPr lang="en-US"/>
           </a:p>
@@ -1826,7 +1826,7 @@
           <a:p>
             <a:fld id="{3B638056-2271-4463-BAE1-4AC5602DC725}" type="datetimeFigureOut">
               <a:rPr lang="en-US" smtClean="0"/>
-              <a:t>12/30/2015</a:t>
+              <a:t>1/2/2016</a:t>
             </a:fld>
             <a:endParaRPr lang="en-US"/>
           </a:p>
@@ -2103,7 +2103,7 @@
           <a:p>
             <a:fld id="{3B638056-2271-4463-BAE1-4AC5602DC725}" type="datetimeFigureOut">
               <a:rPr lang="en-US" smtClean="0"/>
-              <a:t>12/30/2015</a:t>
+              <a:t>1/2/2016</a:t>
             </a:fld>
             <a:endParaRPr lang="en-US"/>
           </a:p>
@@ -2356,7 +2356,7 @@
           <a:p>
             <a:fld id="{3B638056-2271-4463-BAE1-4AC5602DC725}" type="datetimeFigureOut">
               <a:rPr lang="en-US" smtClean="0"/>
-              <a:t>12/30/2015</a:t>
+              <a:t>1/2/2016</a:t>
             </a:fld>
             <a:endParaRPr lang="en-US"/>
           </a:p>
@@ -2569,7 +2569,7 @@
           <a:p>
             <a:fld id="{3B638056-2271-4463-BAE1-4AC5602DC725}" type="datetimeFigureOut">
               <a:rPr lang="en-US" smtClean="0"/>
-              <a:t>12/30/2015</a:t>
+              <a:t>1/2/2016</a:t>
             </a:fld>
             <a:endParaRPr lang="en-US"/>
           </a:p>
@@ -2974,144 +2974,6 @@
           <a:chExt cx="0" cy="0"/>
         </a:xfrm>
       </p:grpSpPr>
-      <p:sp>
-        <p:nvSpPr>
-          <p:cNvPr id="22" name="Rectangle 21"/>
-          <p:cNvSpPr/>
-          <p:nvPr/>
-        </p:nvSpPr>
-        <p:spPr>
-          <a:xfrm>
-            <a:off x="578223" y="3509683"/>
-            <a:ext cx="3240742" cy="3240742"/>
-          </a:xfrm>
-          <a:prstGeom prst="rect">
-            <a:avLst/>
-          </a:prstGeom>
-          <a:noFill/>
-          <a:ln w="28575">
-            <a:solidFill>
-              <a:srgbClr val="23B4A4"/>
-            </a:solidFill>
-          </a:ln>
-        </p:spPr>
-        <p:style>
-          <a:lnRef idx="2">
-            <a:schemeClr val="accent1">
-              <a:shade val="50000"/>
-            </a:schemeClr>
-          </a:lnRef>
-          <a:fillRef idx="1">
-            <a:schemeClr val="accent1"/>
-          </a:fillRef>
-          <a:effectRef idx="0">
-            <a:schemeClr val="accent1"/>
-          </a:effectRef>
-          <a:fontRef idx="minor">
-            <a:schemeClr val="lt1"/>
-          </a:fontRef>
-        </p:style>
-        <p:txBody>
-          <a:bodyPr rtlCol="0" anchor="ctr"/>
-          <a:lstStyle/>
-          <a:p>
-            <a:pPr algn="ctr"/>
-            <a:endParaRPr lang="en-US"/>
-          </a:p>
-        </p:txBody>
-      </p:sp>
-      <p:sp>
-        <p:nvSpPr>
-          <p:cNvPr id="23" name="Rectangle 22"/>
-          <p:cNvSpPr/>
-          <p:nvPr/>
-        </p:nvSpPr>
-        <p:spPr>
-          <a:xfrm>
-            <a:off x="4468905" y="3509683"/>
-            <a:ext cx="3240742" cy="3240742"/>
-          </a:xfrm>
-          <a:prstGeom prst="rect">
-            <a:avLst/>
-          </a:prstGeom>
-          <a:noFill/>
-          <a:ln w="28575">
-            <a:solidFill>
-              <a:srgbClr val="23B4A4"/>
-            </a:solidFill>
-          </a:ln>
-        </p:spPr>
-        <p:style>
-          <a:lnRef idx="2">
-            <a:schemeClr val="accent1">
-              <a:shade val="50000"/>
-            </a:schemeClr>
-          </a:lnRef>
-          <a:fillRef idx="1">
-            <a:schemeClr val="accent1"/>
-          </a:fillRef>
-          <a:effectRef idx="0">
-            <a:schemeClr val="accent1"/>
-          </a:effectRef>
-          <a:fontRef idx="minor">
-            <a:schemeClr val="lt1"/>
-          </a:fontRef>
-        </p:style>
-        <p:txBody>
-          <a:bodyPr rtlCol="0" anchor="ctr"/>
-          <a:lstStyle/>
-          <a:p>
-            <a:pPr algn="ctr"/>
-            <a:endParaRPr lang="en-US"/>
-          </a:p>
-        </p:txBody>
-      </p:sp>
-      <p:sp>
-        <p:nvSpPr>
-          <p:cNvPr id="24" name="Rectangle 23"/>
-          <p:cNvSpPr/>
-          <p:nvPr/>
-        </p:nvSpPr>
-        <p:spPr>
-          <a:xfrm>
-            <a:off x="8359587" y="3509683"/>
-            <a:ext cx="3240742" cy="3240742"/>
-          </a:xfrm>
-          <a:prstGeom prst="rect">
-            <a:avLst/>
-          </a:prstGeom>
-          <a:noFill/>
-          <a:ln w="28575">
-            <a:solidFill>
-              <a:srgbClr val="23B4A4"/>
-            </a:solidFill>
-          </a:ln>
-        </p:spPr>
-        <p:style>
-          <a:lnRef idx="2">
-            <a:schemeClr val="accent1">
-              <a:shade val="50000"/>
-            </a:schemeClr>
-          </a:lnRef>
-          <a:fillRef idx="1">
-            <a:schemeClr val="accent1"/>
-          </a:fillRef>
-          <a:effectRef idx="0">
-            <a:schemeClr val="accent1"/>
-          </a:effectRef>
-          <a:fontRef idx="minor">
-            <a:schemeClr val="lt1"/>
-          </a:fontRef>
-        </p:style>
-        <p:txBody>
-          <a:bodyPr rtlCol="0" anchor="ctr"/>
-          <a:lstStyle/>
-          <a:p>
-            <a:pPr algn="ctr"/>
-            <a:endParaRPr lang="en-US"/>
-          </a:p>
-        </p:txBody>
-      </p:sp>
       <p:grpSp>
         <p:nvGrpSpPr>
           <p:cNvPr id="2" name="Group 1"/>
@@ -3120,7 +2982,7 @@
         </p:nvGrpSpPr>
         <p:grpSpPr>
           <a:xfrm>
-            <a:off x="578223" y="80683"/>
+            <a:off x="578223" y="94130"/>
             <a:ext cx="3240742" cy="3240742"/>
             <a:chOff x="578223" y="80683"/>
             <a:chExt cx="3240742" cy="3240742"/>
@@ -3241,16 +3103,16 @@
       </p:grpSp>
       <p:grpSp>
         <p:nvGrpSpPr>
-          <p:cNvPr id="3" name="Group 2"/>
+          <p:cNvPr id="5" name="Group 4"/>
           <p:cNvGrpSpPr/>
           <p:nvPr/>
         </p:nvGrpSpPr>
         <p:grpSpPr>
           <a:xfrm>
-            <a:off x="4468905" y="94130"/>
-            <a:ext cx="3240742" cy="3240742"/>
-            <a:chOff x="4468905" y="94130"/>
-            <a:chExt cx="3240742" cy="3240742"/>
+            <a:off x="4468903" y="67236"/>
+            <a:ext cx="3240743" cy="3254189"/>
+            <a:chOff x="4468903" y="80683"/>
+            <a:chExt cx="3240743" cy="3254189"/>
           </a:xfrm>
         </p:grpSpPr>
         <p:sp>
@@ -3261,8 +3123,8 @@
           </p:nvSpPr>
           <p:spPr>
             <a:xfrm>
-              <a:off x="4468905" y="94130"/>
-              <a:ext cx="3240742" cy="3240742"/>
+              <a:off x="4468905" y="80683"/>
+              <a:ext cx="3240741" cy="3254189"/>
             </a:xfrm>
             <a:prstGeom prst="rect">
               <a:avLst/>
@@ -3307,8 +3169,8 @@
           </p:nvSpPr>
           <p:spPr>
             <a:xfrm>
-              <a:off x="4468905" y="94130"/>
-              <a:ext cx="3240741" cy="954107"/>
+              <a:off x="4468903" y="94130"/>
+              <a:ext cx="3240743" cy="954107"/>
             </a:xfrm>
             <a:prstGeom prst="rect">
               <a:avLst/>
@@ -3323,13 +3185,13 @@
             <a:p>
               <a:pPr algn="ctr"/>
               <a:r>
-                <a:rPr lang="en-US" sz="2800" dirty="0" smtClean="0">
+                <a:rPr lang="en-US" sz="2700" dirty="0" smtClean="0">
                   <a:latin typeface="Segoe UI Light" panose="020B0502040204020203" pitchFamily="34" charset="0"/>
                   <a:cs typeface="Segoe UI Light" panose="020B0502040204020203" pitchFamily="34" charset="0"/>
                 </a:rPr>
                 <a:t>Piezoelectric Energy Conversion</a:t>
               </a:r>
-              <a:endParaRPr lang="en-US" sz="2800" dirty="0">
+              <a:endParaRPr lang="en-US" sz="2700" dirty="0">
                 <a:latin typeface="Segoe UI Light" panose="020B0502040204020203" pitchFamily="34" charset="0"/>
                 <a:cs typeface="Segoe UI Light" panose="020B0502040204020203" pitchFamily="34" charset="0"/>
               </a:endParaRPr>
@@ -3357,7 +3219,7 @@
           </p:blipFill>
           <p:spPr>
             <a:xfrm>
-              <a:off x="4948516" y="1024446"/>
+              <a:off x="4951561" y="1024446"/>
               <a:ext cx="2275427" cy="2117641"/>
             </a:xfrm>
             <a:prstGeom prst="rect">
@@ -3491,6 +3353,93 @@
           </p:spPr>
         </p:pic>
       </p:grpSp>
+      <p:pic>
+        <p:nvPicPr>
+          <p:cNvPr id="6" name="Picture 5"/>
+          <p:cNvPicPr>
+            <a:picLocks noChangeAspect="1"/>
+          </p:cNvPicPr>
+          <p:nvPr/>
+        </p:nvPicPr>
+        <p:blipFill rotWithShape="1">
+          <a:blip r:embed="rId5">
+            <a:extLst>
+              <a:ext uri="{28A0092B-C50C-407E-A947-70E740481C1C}">
+                <a14:useLocalDpi xmlns:a14="http://schemas.microsoft.com/office/drawing/2010/main" val="0"/>
+              </a:ext>
+            </a:extLst>
+          </a:blip>
+          <a:srcRect t="1217"/>
+          <a:stretch/>
+        </p:blipFill>
+        <p:spPr>
+          <a:xfrm>
+            <a:off x="551226" y="3496235"/>
+            <a:ext cx="3267739" cy="3276171"/>
+          </a:xfrm>
+          <a:prstGeom prst="rect">
+            <a:avLst/>
+          </a:prstGeom>
+        </p:spPr>
+      </p:pic>
+      <p:pic>
+        <p:nvPicPr>
+          <p:cNvPr id="7" name="Picture 6"/>
+          <p:cNvPicPr>
+            <a:picLocks noChangeAspect="1"/>
+          </p:cNvPicPr>
+          <p:nvPr/>
+        </p:nvPicPr>
+        <p:blipFill rotWithShape="1">
+          <a:blip r:embed="rId6">
+            <a:extLst>
+              <a:ext uri="{28A0092B-C50C-407E-A947-70E740481C1C}">
+                <a14:useLocalDpi xmlns:a14="http://schemas.microsoft.com/office/drawing/2010/main" val="0"/>
+              </a:ext>
+            </a:extLst>
+          </a:blip>
+          <a:srcRect t="1174" r="2479"/>
+          <a:stretch/>
+        </p:blipFill>
+        <p:spPr>
+          <a:xfrm>
+            <a:off x="4444249" y="3482788"/>
+            <a:ext cx="3287810" cy="3289618"/>
+          </a:xfrm>
+          <a:prstGeom prst="rect">
+            <a:avLst/>
+          </a:prstGeom>
+        </p:spPr>
+      </p:pic>
+      <p:pic>
+        <p:nvPicPr>
+          <p:cNvPr id="8" name="Picture 7"/>
+          <p:cNvPicPr>
+            <a:picLocks noChangeAspect="1"/>
+          </p:cNvPicPr>
+          <p:nvPr/>
+        </p:nvPicPr>
+        <p:blipFill rotWithShape="1">
+          <a:blip r:embed="rId7">
+            <a:extLst>
+              <a:ext uri="{28A0092B-C50C-407E-A947-70E740481C1C}">
+                <a14:useLocalDpi xmlns:a14="http://schemas.microsoft.com/office/drawing/2010/main" val="0"/>
+              </a:ext>
+            </a:extLst>
+          </a:blip>
+          <a:srcRect t="1174"/>
+          <a:stretch/>
+        </p:blipFill>
+        <p:spPr>
+          <a:xfrm>
+            <a:off x="8357343" y="3482788"/>
+            <a:ext cx="3273836" cy="3289618"/>
+          </a:xfrm>
+          <a:prstGeom prst="rect">
+            <a:avLst/>
+          </a:prstGeom>
+        </p:spPr>
+      </p:pic>
     </p:spTree>
     <p:extLst>
       <p:ext uri="{BB962C8B-B14F-4D97-AF65-F5344CB8AC3E}">
@@ -3521,144 +3470,6 @@
           <a:chExt cx="0" cy="0"/>
         </a:xfrm>
       </p:grpSpPr>
-      <p:sp>
-        <p:nvSpPr>
-          <p:cNvPr id="22" name="Rectangle 21"/>
-          <p:cNvSpPr/>
-          <p:nvPr/>
-        </p:nvSpPr>
-        <p:spPr>
-          <a:xfrm>
-            <a:off x="578223" y="3509683"/>
-            <a:ext cx="3240742" cy="3240742"/>
-          </a:xfrm>
-          <a:prstGeom prst="rect">
-            <a:avLst/>
-          </a:prstGeom>
-          <a:noFill/>
-          <a:ln w="28575">
-            <a:solidFill>
-              <a:srgbClr val="23B4A4"/>
-            </a:solidFill>
-          </a:ln>
-        </p:spPr>
-        <p:style>
-          <a:lnRef idx="2">
-            <a:schemeClr val="accent1">
-              <a:shade val="50000"/>
-            </a:schemeClr>
-          </a:lnRef>
-          <a:fillRef idx="1">
-            <a:schemeClr val="accent1"/>
-          </a:fillRef>
-          <a:effectRef idx="0">
-            <a:schemeClr val="accent1"/>
-          </a:effectRef>
-          <a:fontRef idx="minor">
-            <a:schemeClr val="lt1"/>
-          </a:fontRef>
-        </p:style>
-        <p:txBody>
-          <a:bodyPr rtlCol="0" anchor="ctr"/>
-          <a:lstStyle/>
-          <a:p>
-            <a:pPr algn="ctr"/>
-            <a:endParaRPr lang="en-US"/>
-          </a:p>
-        </p:txBody>
-      </p:sp>
-      <p:sp>
-        <p:nvSpPr>
-          <p:cNvPr id="23" name="Rectangle 22"/>
-          <p:cNvSpPr/>
-          <p:nvPr/>
-        </p:nvSpPr>
-        <p:spPr>
-          <a:xfrm>
-            <a:off x="4468905" y="3509683"/>
-            <a:ext cx="3240742" cy="3240742"/>
-          </a:xfrm>
-          <a:prstGeom prst="rect">
-            <a:avLst/>
-          </a:prstGeom>
-          <a:noFill/>
-          <a:ln w="28575">
-            <a:solidFill>
-              <a:srgbClr val="23B4A4"/>
-            </a:solidFill>
-          </a:ln>
-        </p:spPr>
-        <p:style>
-          <a:lnRef idx="2">
-            <a:schemeClr val="accent1">
-              <a:shade val="50000"/>
-            </a:schemeClr>
-          </a:lnRef>
-          <a:fillRef idx="1">
-            <a:schemeClr val="accent1"/>
-          </a:fillRef>
-          <a:effectRef idx="0">
-            <a:schemeClr val="accent1"/>
-          </a:effectRef>
-          <a:fontRef idx="minor">
-            <a:schemeClr val="lt1"/>
-          </a:fontRef>
-        </p:style>
-        <p:txBody>
-          <a:bodyPr rtlCol="0" anchor="ctr"/>
-          <a:lstStyle/>
-          <a:p>
-            <a:pPr algn="ctr"/>
-            <a:endParaRPr lang="en-US"/>
-          </a:p>
-        </p:txBody>
-      </p:sp>
-      <p:sp>
-        <p:nvSpPr>
-          <p:cNvPr id="24" name="Rectangle 23"/>
-          <p:cNvSpPr/>
-          <p:nvPr/>
-        </p:nvSpPr>
-        <p:spPr>
-          <a:xfrm>
-            <a:off x="8359587" y="3509683"/>
-            <a:ext cx="3240742" cy="3240742"/>
-          </a:xfrm>
-          <a:prstGeom prst="rect">
-            <a:avLst/>
-          </a:prstGeom>
-          <a:noFill/>
-          <a:ln w="28575">
-            <a:solidFill>
-              <a:srgbClr val="23B4A4"/>
-            </a:solidFill>
-          </a:ln>
-        </p:spPr>
-        <p:style>
-          <a:lnRef idx="2">
-            <a:schemeClr val="accent1">
-              <a:shade val="50000"/>
-            </a:schemeClr>
-          </a:lnRef>
-          <a:fillRef idx="1">
-            <a:schemeClr val="accent1"/>
-          </a:fillRef>
-          <a:effectRef idx="0">
-            <a:schemeClr val="accent1"/>
-          </a:effectRef>
-          <a:fontRef idx="minor">
-            <a:schemeClr val="lt1"/>
-          </a:fontRef>
-        </p:style>
-        <p:txBody>
-          <a:bodyPr rtlCol="0" anchor="ctr"/>
-          <a:lstStyle/>
-          <a:p>
-            <a:pPr algn="ctr"/>
-            <a:endParaRPr lang="en-US"/>
-          </a:p>
-        </p:txBody>
-      </p:sp>
       <p:grpSp>
         <p:nvGrpSpPr>
           <p:cNvPr id="2" name="Group 1"/>
@@ -3820,7 +3631,7 @@
         </p:nvGrpSpPr>
         <p:grpSpPr>
           <a:xfrm>
-            <a:off x="4468905" y="94130"/>
+            <a:off x="4468905" y="107577"/>
             <a:ext cx="3240742" cy="3240742"/>
             <a:chOff x="4468905" y="94130"/>
             <a:chExt cx="3240742" cy="3240742"/>
@@ -4090,6 +3901,93 @@
           </p:spPr>
         </p:pic>
       </p:grpSp>
+      <p:pic>
+        <p:nvPicPr>
+          <p:cNvPr id="6" name="Picture 5"/>
+          <p:cNvPicPr>
+            <a:picLocks noChangeAspect="1"/>
+          </p:cNvPicPr>
+          <p:nvPr/>
+        </p:nvPicPr>
+        <p:blipFill rotWithShape="1">
+          <a:blip r:embed="rId5">
+            <a:extLst>
+              <a:ext uri="{28A0092B-C50C-407E-A947-70E740481C1C}">
+                <a14:useLocalDpi xmlns:a14="http://schemas.microsoft.com/office/drawing/2010/main" val="0"/>
+              </a:ext>
+            </a:extLst>
+          </a:blip>
+          <a:srcRect t="1068" r="1431"/>
+          <a:stretch/>
+        </p:blipFill>
+        <p:spPr>
+          <a:xfrm>
+            <a:off x="578223" y="3509682"/>
+            <a:ext cx="3281083" cy="3281083"/>
+          </a:xfrm>
+          <a:prstGeom prst="rect">
+            <a:avLst/>
+          </a:prstGeom>
+        </p:spPr>
+      </p:pic>
+      <p:pic>
+        <p:nvPicPr>
+          <p:cNvPr id="7" name="Picture 6"/>
+          <p:cNvPicPr>
+            <a:picLocks noChangeAspect="1"/>
+          </p:cNvPicPr>
+          <p:nvPr/>
+        </p:nvPicPr>
+        <p:blipFill rotWithShape="1">
+          <a:blip r:embed="rId6">
+            <a:extLst>
+              <a:ext uri="{28A0092B-C50C-407E-A947-70E740481C1C}">
+                <a14:useLocalDpi xmlns:a14="http://schemas.microsoft.com/office/drawing/2010/main" val="0"/>
+              </a:ext>
+            </a:extLst>
+          </a:blip>
+          <a:srcRect t="1431"/>
+          <a:stretch/>
+        </p:blipFill>
+        <p:spPr>
+          <a:xfrm>
+            <a:off x="4468905" y="3509681"/>
+            <a:ext cx="3273836" cy="3281083"/>
+          </a:xfrm>
+          <a:prstGeom prst="rect">
+            <a:avLst/>
+          </a:prstGeom>
+        </p:spPr>
+      </p:pic>
+      <p:pic>
+        <p:nvPicPr>
+          <p:cNvPr id="8" name="Picture 7"/>
+          <p:cNvPicPr>
+            <a:picLocks noChangeAspect="1"/>
+          </p:cNvPicPr>
+          <p:nvPr/>
+        </p:nvPicPr>
+        <p:blipFill rotWithShape="1">
+          <a:blip r:embed="rId7">
+            <a:extLst>
+              <a:ext uri="{28A0092B-C50C-407E-A947-70E740481C1C}">
+                <a14:useLocalDpi xmlns:a14="http://schemas.microsoft.com/office/drawing/2010/main" val="0"/>
+              </a:ext>
+            </a:extLst>
+          </a:blip>
+          <a:srcRect t="1431" b="-1"/>
+          <a:stretch/>
+        </p:blipFill>
+        <p:spPr>
+          <a:xfrm>
+            <a:off x="8359587" y="3509682"/>
+            <a:ext cx="3273836" cy="3281082"/>
+          </a:xfrm>
+          <a:prstGeom prst="rect">
+            <a:avLst/>
+          </a:prstGeom>
+        </p:spPr>
+      </p:pic>
     </p:spTree>
     <p:extLst>
       <p:ext uri="{BB962C8B-B14F-4D97-AF65-F5344CB8AC3E}">
@@ -4120,144 +4018,6 @@
           <a:chExt cx="0" cy="0"/>
         </a:xfrm>
       </p:grpSpPr>
-      <p:sp>
-        <p:nvSpPr>
-          <p:cNvPr id="22" name="Rectangle 21"/>
-          <p:cNvSpPr/>
-          <p:nvPr/>
-        </p:nvSpPr>
-        <p:spPr>
-          <a:xfrm>
-            <a:off x="578223" y="3509683"/>
-            <a:ext cx="3240742" cy="3240742"/>
-          </a:xfrm>
-          <a:prstGeom prst="rect">
-            <a:avLst/>
-          </a:prstGeom>
-          <a:noFill/>
-          <a:ln w="28575">
-            <a:solidFill>
-              <a:srgbClr val="23B4A4"/>
-            </a:solidFill>
-          </a:ln>
-        </p:spPr>
-        <p:style>
-          <a:lnRef idx="2">
-            <a:schemeClr val="accent1">
-              <a:shade val="50000"/>
-            </a:schemeClr>
-          </a:lnRef>
-          <a:fillRef idx="1">
-            <a:schemeClr val="accent1"/>
-          </a:fillRef>
-          <a:effectRef idx="0">
-            <a:schemeClr val="accent1"/>
-          </a:effectRef>
-          <a:fontRef idx="minor">
-            <a:schemeClr val="lt1"/>
-          </a:fontRef>
-        </p:style>
-        <p:txBody>
-          <a:bodyPr rtlCol="0" anchor="ctr"/>
-          <a:lstStyle/>
-          <a:p>
-            <a:pPr algn="ctr"/>
-            <a:endParaRPr lang="en-US"/>
-          </a:p>
-        </p:txBody>
-      </p:sp>
-      <p:sp>
-        <p:nvSpPr>
-          <p:cNvPr id="23" name="Rectangle 22"/>
-          <p:cNvSpPr/>
-          <p:nvPr/>
-        </p:nvSpPr>
-        <p:spPr>
-          <a:xfrm>
-            <a:off x="4468905" y="3509683"/>
-            <a:ext cx="3240742" cy="3240742"/>
-          </a:xfrm>
-          <a:prstGeom prst="rect">
-            <a:avLst/>
-          </a:prstGeom>
-          <a:noFill/>
-          <a:ln w="28575">
-            <a:solidFill>
-              <a:srgbClr val="23B4A4"/>
-            </a:solidFill>
-          </a:ln>
-        </p:spPr>
-        <p:style>
-          <a:lnRef idx="2">
-            <a:schemeClr val="accent1">
-              <a:shade val="50000"/>
-            </a:schemeClr>
-          </a:lnRef>
-          <a:fillRef idx="1">
-            <a:schemeClr val="accent1"/>
-          </a:fillRef>
-          <a:effectRef idx="0">
-            <a:schemeClr val="accent1"/>
-          </a:effectRef>
-          <a:fontRef idx="minor">
-            <a:schemeClr val="lt1"/>
-          </a:fontRef>
-        </p:style>
-        <p:txBody>
-          <a:bodyPr rtlCol="0" anchor="ctr"/>
-          <a:lstStyle/>
-          <a:p>
-            <a:pPr algn="ctr"/>
-            <a:endParaRPr lang="en-US"/>
-          </a:p>
-        </p:txBody>
-      </p:sp>
-      <p:sp>
-        <p:nvSpPr>
-          <p:cNvPr id="24" name="Rectangle 23"/>
-          <p:cNvSpPr/>
-          <p:nvPr/>
-        </p:nvSpPr>
-        <p:spPr>
-          <a:xfrm>
-            <a:off x="8359587" y="3509683"/>
-            <a:ext cx="3240742" cy="3240742"/>
-          </a:xfrm>
-          <a:prstGeom prst="rect">
-            <a:avLst/>
-          </a:prstGeom>
-          <a:noFill/>
-          <a:ln w="28575">
-            <a:solidFill>
-              <a:srgbClr val="23B4A4"/>
-            </a:solidFill>
-          </a:ln>
-        </p:spPr>
-        <p:style>
-          <a:lnRef idx="2">
-            <a:schemeClr val="accent1">
-              <a:shade val="50000"/>
-            </a:schemeClr>
-          </a:lnRef>
-          <a:fillRef idx="1">
-            <a:schemeClr val="accent1"/>
-          </a:fillRef>
-          <a:effectRef idx="0">
-            <a:schemeClr val="accent1"/>
-          </a:effectRef>
-          <a:fontRef idx="minor">
-            <a:schemeClr val="lt1"/>
-          </a:fontRef>
-        </p:style>
-        <p:txBody>
-          <a:bodyPr rtlCol="0" anchor="ctr"/>
-          <a:lstStyle/>
-          <a:p>
-            <a:pPr algn="ctr"/>
-            <a:endParaRPr lang="en-US"/>
-          </a:p>
-        </p:txBody>
-      </p:sp>
       <p:grpSp>
         <p:nvGrpSpPr>
           <p:cNvPr id="3" name="Group 2"/>
@@ -4405,7 +4165,7 @@
         </p:nvGrpSpPr>
         <p:grpSpPr>
           <a:xfrm>
-            <a:off x="578223" y="80683"/>
+            <a:off x="578223" y="94130"/>
             <a:ext cx="3240742" cy="3240742"/>
             <a:chOff x="578223" y="80683"/>
             <a:chExt cx="3240742" cy="3240742"/>
@@ -4673,6 +4433,93 @@
           </p:spPr>
         </p:pic>
       </p:grpSp>
+      <p:pic>
+        <p:nvPicPr>
+          <p:cNvPr id="5" name="Picture 4"/>
+          <p:cNvPicPr>
+            <a:picLocks noChangeAspect="1"/>
+          </p:cNvPicPr>
+          <p:nvPr/>
+        </p:nvPicPr>
+        <p:blipFill rotWithShape="1">
+          <a:blip r:embed="rId5">
+            <a:extLst>
+              <a:ext uri="{28A0092B-C50C-407E-A947-70E740481C1C}">
+                <a14:useLocalDpi xmlns:a14="http://schemas.microsoft.com/office/drawing/2010/main" val="0"/>
+              </a:ext>
+            </a:extLst>
+          </a:blip>
+          <a:srcRect t="1068"/>
+          <a:stretch/>
+        </p:blipFill>
+        <p:spPr>
+          <a:xfrm>
+            <a:off x="578223" y="3482788"/>
+            <a:ext cx="3267739" cy="3281083"/>
+          </a:xfrm>
+          <a:prstGeom prst="rect">
+            <a:avLst/>
+          </a:prstGeom>
+        </p:spPr>
+      </p:pic>
+      <p:pic>
+        <p:nvPicPr>
+          <p:cNvPr id="6" name="Picture 5"/>
+          <p:cNvPicPr>
+            <a:picLocks noChangeAspect="1"/>
+          </p:cNvPicPr>
+          <p:nvPr/>
+        </p:nvPicPr>
+        <p:blipFill rotWithShape="1">
+          <a:blip r:embed="rId6">
+            <a:extLst>
+              <a:ext uri="{28A0092B-C50C-407E-A947-70E740481C1C}">
+                <a14:useLocalDpi xmlns:a14="http://schemas.microsoft.com/office/drawing/2010/main" val="0"/>
+              </a:ext>
+            </a:extLst>
+          </a:blip>
+          <a:srcRect t="1431"/>
+          <a:stretch/>
+        </p:blipFill>
+        <p:spPr>
+          <a:xfrm>
+            <a:off x="4468905" y="3482787"/>
+            <a:ext cx="3273836" cy="3281083"/>
+          </a:xfrm>
+          <a:prstGeom prst="rect">
+            <a:avLst/>
+          </a:prstGeom>
+        </p:spPr>
+      </p:pic>
+      <p:pic>
+        <p:nvPicPr>
+          <p:cNvPr id="7" name="Picture 6"/>
+          <p:cNvPicPr>
+            <a:picLocks noChangeAspect="1"/>
+          </p:cNvPicPr>
+          <p:nvPr/>
+        </p:nvPicPr>
+        <p:blipFill rotWithShape="1">
+          <a:blip r:embed="rId7">
+            <a:extLst>
+              <a:ext uri="{28A0092B-C50C-407E-A947-70E740481C1C}">
+                <a14:useLocalDpi xmlns:a14="http://schemas.microsoft.com/office/drawing/2010/main" val="0"/>
+              </a:ext>
+            </a:extLst>
+          </a:blip>
+          <a:srcRect t="1431" b="-1"/>
+          <a:stretch/>
+        </p:blipFill>
+        <p:spPr>
+          <a:xfrm>
+            <a:off x="8359587" y="3482788"/>
+            <a:ext cx="3273836" cy="3281082"/>
+          </a:xfrm>
+          <a:prstGeom prst="rect">
+            <a:avLst/>
+          </a:prstGeom>
+        </p:spPr>
+      </p:pic>
     </p:spTree>
     <p:extLst>
       <p:ext uri="{BB962C8B-B14F-4D97-AF65-F5344CB8AC3E}">
@@ -4703,144 +4550,6 @@
           <a:chExt cx="0" cy="0"/>
         </a:xfrm>
       </p:grpSpPr>
-      <p:sp>
-        <p:nvSpPr>
-          <p:cNvPr id="22" name="Rectangle 21"/>
-          <p:cNvSpPr/>
-          <p:nvPr/>
-        </p:nvSpPr>
-        <p:spPr>
-          <a:xfrm>
-            <a:off x="578223" y="3509683"/>
-            <a:ext cx="3240742" cy="3240742"/>
-          </a:xfrm>
-          <a:prstGeom prst="rect">
-            <a:avLst/>
-          </a:prstGeom>
-          <a:noFill/>
-          <a:ln w="28575">
-            <a:solidFill>
-              <a:srgbClr val="23B4A4"/>
-            </a:solidFill>
-          </a:ln>
-        </p:spPr>
-        <p:style>
-          <a:lnRef idx="2">
-            <a:schemeClr val="accent1">
-              <a:shade val="50000"/>
-            </a:schemeClr>
-          </a:lnRef>
-          <a:fillRef idx="1">
-            <a:schemeClr val="accent1"/>
-          </a:fillRef>
-          <a:effectRef idx="0">
-            <a:schemeClr val="accent1"/>
-          </a:effectRef>
-          <a:fontRef idx="minor">
-            <a:schemeClr val="lt1"/>
-          </a:fontRef>
-        </p:style>
-        <p:txBody>
-          <a:bodyPr rtlCol="0" anchor="ctr"/>
-          <a:lstStyle/>
-          <a:p>
-            <a:pPr algn="ctr"/>
-            <a:endParaRPr lang="en-US"/>
-          </a:p>
-        </p:txBody>
-      </p:sp>
-      <p:sp>
-        <p:nvSpPr>
-          <p:cNvPr id="23" name="Rectangle 22"/>
-          <p:cNvSpPr/>
-          <p:nvPr/>
-        </p:nvSpPr>
-        <p:spPr>
-          <a:xfrm>
-            <a:off x="4468905" y="3509683"/>
-            <a:ext cx="3240742" cy="3240742"/>
-          </a:xfrm>
-          <a:prstGeom prst="rect">
-            <a:avLst/>
-          </a:prstGeom>
-          <a:noFill/>
-          <a:ln w="28575">
-            <a:solidFill>
-              <a:srgbClr val="23B4A4"/>
-            </a:solidFill>
-          </a:ln>
-        </p:spPr>
-        <p:style>
-          <a:lnRef idx="2">
-            <a:schemeClr val="accent1">
-              <a:shade val="50000"/>
-            </a:schemeClr>
-          </a:lnRef>
-          <a:fillRef idx="1">
-            <a:schemeClr val="accent1"/>
-          </a:fillRef>
-          <a:effectRef idx="0">
-            <a:schemeClr val="accent1"/>
-          </a:effectRef>
-          <a:fontRef idx="minor">
-            <a:schemeClr val="lt1"/>
-          </a:fontRef>
-        </p:style>
-        <p:txBody>
-          <a:bodyPr rtlCol="0" anchor="ctr"/>
-          <a:lstStyle/>
-          <a:p>
-            <a:pPr algn="ctr"/>
-            <a:endParaRPr lang="en-US"/>
-          </a:p>
-        </p:txBody>
-      </p:sp>
-      <p:sp>
-        <p:nvSpPr>
-          <p:cNvPr id="24" name="Rectangle 23"/>
-          <p:cNvSpPr/>
-          <p:nvPr/>
-        </p:nvSpPr>
-        <p:spPr>
-          <a:xfrm>
-            <a:off x="8359587" y="3509683"/>
-            <a:ext cx="3240742" cy="3240742"/>
-          </a:xfrm>
-          <a:prstGeom prst="rect">
-            <a:avLst/>
-          </a:prstGeom>
-          <a:noFill/>
-          <a:ln w="28575">
-            <a:solidFill>
-              <a:srgbClr val="23B4A4"/>
-            </a:solidFill>
-          </a:ln>
-        </p:spPr>
-        <p:style>
-          <a:lnRef idx="2">
-            <a:schemeClr val="accent1">
-              <a:shade val="50000"/>
-            </a:schemeClr>
-          </a:lnRef>
-          <a:fillRef idx="1">
-            <a:schemeClr val="accent1"/>
-          </a:fillRef>
-          <a:effectRef idx="0">
-            <a:schemeClr val="accent1"/>
-          </a:effectRef>
-          <a:fontRef idx="minor">
-            <a:schemeClr val="lt1"/>
-          </a:fontRef>
-        </p:style>
-        <p:txBody>
-          <a:bodyPr rtlCol="0" anchor="ctr"/>
-          <a:lstStyle/>
-          <a:p>
-            <a:pPr algn="ctr"/>
-            <a:endParaRPr lang="en-US"/>
-          </a:p>
-        </p:txBody>
-      </p:sp>
       <p:grpSp>
         <p:nvGrpSpPr>
           <p:cNvPr id="2" name="Group 1"/>
@@ -4849,7 +4558,7 @@
         </p:nvGrpSpPr>
         <p:grpSpPr>
           <a:xfrm>
-            <a:off x="578223" y="80683"/>
+            <a:off x="578223" y="94130"/>
             <a:ext cx="3240742" cy="3240742"/>
             <a:chOff x="578223" y="80683"/>
             <a:chExt cx="3240742" cy="3240742"/>
@@ -5299,6 +5008,93 @@
           </p:spPr>
         </p:pic>
       </p:grpSp>
+      <p:pic>
+        <p:nvPicPr>
+          <p:cNvPr id="5" name="Picture 4"/>
+          <p:cNvPicPr>
+            <a:picLocks noChangeAspect="1"/>
+          </p:cNvPicPr>
+          <p:nvPr/>
+        </p:nvPicPr>
+        <p:blipFill rotWithShape="1">
+          <a:blip r:embed="rId6">
+            <a:extLst>
+              <a:ext uri="{28A0092B-C50C-407E-A947-70E740481C1C}">
+                <a14:useLocalDpi xmlns:a14="http://schemas.microsoft.com/office/drawing/2010/main" val="0"/>
+              </a:ext>
+            </a:extLst>
+          </a:blip>
+          <a:srcRect t="1068"/>
+          <a:stretch/>
+        </p:blipFill>
+        <p:spPr>
+          <a:xfrm>
+            <a:off x="578223" y="3469341"/>
+            <a:ext cx="3267739" cy="3281083"/>
+          </a:xfrm>
+          <a:prstGeom prst="rect">
+            <a:avLst/>
+          </a:prstGeom>
+        </p:spPr>
+      </p:pic>
+      <p:pic>
+        <p:nvPicPr>
+          <p:cNvPr id="6" name="Picture 5"/>
+          <p:cNvPicPr>
+            <a:picLocks noChangeAspect="1"/>
+          </p:cNvPicPr>
+          <p:nvPr/>
+        </p:nvPicPr>
+        <p:blipFill rotWithShape="1">
+          <a:blip r:embed="rId7">
+            <a:extLst>
+              <a:ext uri="{28A0092B-C50C-407E-A947-70E740481C1C}">
+                <a14:useLocalDpi xmlns:a14="http://schemas.microsoft.com/office/drawing/2010/main" val="0"/>
+              </a:ext>
+            </a:extLst>
+          </a:blip>
+          <a:srcRect t="1431"/>
+          <a:stretch/>
+        </p:blipFill>
+        <p:spPr>
+          <a:xfrm>
+            <a:off x="4468905" y="3469340"/>
+            <a:ext cx="3273836" cy="3281083"/>
+          </a:xfrm>
+          <a:prstGeom prst="rect">
+            <a:avLst/>
+          </a:prstGeom>
+        </p:spPr>
+      </p:pic>
+      <p:pic>
+        <p:nvPicPr>
+          <p:cNvPr id="7" name="Picture 6"/>
+          <p:cNvPicPr>
+            <a:picLocks noChangeAspect="1"/>
+          </p:cNvPicPr>
+          <p:nvPr/>
+        </p:nvPicPr>
+        <p:blipFill rotWithShape="1">
+          <a:blip r:embed="rId8">
+            <a:extLst>
+              <a:ext uri="{28A0092B-C50C-407E-A947-70E740481C1C}">
+                <a14:useLocalDpi xmlns:a14="http://schemas.microsoft.com/office/drawing/2010/main" val="0"/>
+              </a:ext>
+            </a:extLst>
+          </a:blip>
+          <a:srcRect t="1501"/>
+          <a:stretch/>
+        </p:blipFill>
+        <p:spPr>
+          <a:xfrm>
+            <a:off x="8359587" y="3469340"/>
+            <a:ext cx="3273836" cy="3278733"/>
+          </a:xfrm>
+          <a:prstGeom prst="rect">
+            <a:avLst/>
+          </a:prstGeom>
+        </p:spPr>
+      </p:pic>
     </p:spTree>
     <p:extLst>
       <p:ext uri="{BB962C8B-B14F-4D97-AF65-F5344CB8AC3E}">
@@ -5329,144 +5125,6 @@
           <a:chExt cx="0" cy="0"/>
         </a:xfrm>
       </p:grpSpPr>
-      <p:sp>
-        <p:nvSpPr>
-          <p:cNvPr id="22" name="Rectangle 21"/>
-          <p:cNvSpPr/>
-          <p:nvPr/>
-        </p:nvSpPr>
-        <p:spPr>
-          <a:xfrm>
-            <a:off x="578223" y="3509683"/>
-            <a:ext cx="3240742" cy="3240742"/>
-          </a:xfrm>
-          <a:prstGeom prst="rect">
-            <a:avLst/>
-          </a:prstGeom>
-          <a:noFill/>
-          <a:ln w="28575">
-            <a:solidFill>
-              <a:srgbClr val="23B4A4"/>
-            </a:solidFill>
-          </a:ln>
-        </p:spPr>
-        <p:style>
-          <a:lnRef idx="2">
-            <a:schemeClr val="accent1">
-              <a:shade val="50000"/>
-            </a:schemeClr>
-          </a:lnRef>
-          <a:fillRef idx="1">
-            <a:schemeClr val="accent1"/>
-          </a:fillRef>
-          <a:effectRef idx="0">
-            <a:schemeClr val="accent1"/>
-          </a:effectRef>
-          <a:fontRef idx="minor">
-            <a:schemeClr val="lt1"/>
-          </a:fontRef>
-        </p:style>
-        <p:txBody>
-          <a:bodyPr rtlCol="0" anchor="ctr"/>
-          <a:lstStyle/>
-          <a:p>
-            <a:pPr algn="ctr"/>
-            <a:endParaRPr lang="en-US"/>
-          </a:p>
-        </p:txBody>
-      </p:sp>
-      <p:sp>
-        <p:nvSpPr>
-          <p:cNvPr id="23" name="Rectangle 22"/>
-          <p:cNvSpPr/>
-          <p:nvPr/>
-        </p:nvSpPr>
-        <p:spPr>
-          <a:xfrm>
-            <a:off x="4468905" y="3509683"/>
-            <a:ext cx="3240742" cy="3240742"/>
-          </a:xfrm>
-          <a:prstGeom prst="rect">
-            <a:avLst/>
-          </a:prstGeom>
-          <a:noFill/>
-          <a:ln w="28575">
-            <a:solidFill>
-              <a:srgbClr val="23B4A4"/>
-            </a:solidFill>
-          </a:ln>
-        </p:spPr>
-        <p:style>
-          <a:lnRef idx="2">
-            <a:schemeClr val="accent1">
-              <a:shade val="50000"/>
-            </a:schemeClr>
-          </a:lnRef>
-          <a:fillRef idx="1">
-            <a:schemeClr val="accent1"/>
-          </a:fillRef>
-          <a:effectRef idx="0">
-            <a:schemeClr val="accent1"/>
-          </a:effectRef>
-          <a:fontRef idx="minor">
-            <a:schemeClr val="lt1"/>
-          </a:fontRef>
-        </p:style>
-        <p:txBody>
-          <a:bodyPr rtlCol="0" anchor="ctr"/>
-          <a:lstStyle/>
-          <a:p>
-            <a:pPr algn="ctr"/>
-            <a:endParaRPr lang="en-US"/>
-          </a:p>
-        </p:txBody>
-      </p:sp>
-      <p:sp>
-        <p:nvSpPr>
-          <p:cNvPr id="24" name="Rectangle 23"/>
-          <p:cNvSpPr/>
-          <p:nvPr/>
-        </p:nvSpPr>
-        <p:spPr>
-          <a:xfrm>
-            <a:off x="8359587" y="3509683"/>
-            <a:ext cx="3240742" cy="3240742"/>
-          </a:xfrm>
-          <a:prstGeom prst="rect">
-            <a:avLst/>
-          </a:prstGeom>
-          <a:noFill/>
-          <a:ln w="28575">
-            <a:solidFill>
-              <a:srgbClr val="23B4A4"/>
-            </a:solidFill>
-          </a:ln>
-        </p:spPr>
-        <p:style>
-          <a:lnRef idx="2">
-            <a:schemeClr val="accent1">
-              <a:shade val="50000"/>
-            </a:schemeClr>
-          </a:lnRef>
-          <a:fillRef idx="1">
-            <a:schemeClr val="accent1"/>
-          </a:fillRef>
-          <a:effectRef idx="0">
-            <a:schemeClr val="accent1"/>
-          </a:effectRef>
-          <a:fontRef idx="minor">
-            <a:schemeClr val="lt1"/>
-          </a:fontRef>
-        </p:style>
-        <p:txBody>
-          <a:bodyPr rtlCol="0" anchor="ctr"/>
-          <a:lstStyle/>
-          <a:p>
-            <a:pPr algn="ctr"/>
-            <a:endParaRPr lang="en-US"/>
-          </a:p>
-        </p:txBody>
-      </p:sp>
       <p:grpSp>
         <p:nvGrpSpPr>
           <p:cNvPr id="2" name="Group 1"/>
@@ -5475,7 +5133,7 @@
         </p:nvGrpSpPr>
         <p:grpSpPr>
           <a:xfrm>
-            <a:off x="578223" y="80683"/>
+            <a:off x="578223" y="94130"/>
             <a:ext cx="3240742" cy="3240742"/>
             <a:chOff x="578223" y="80683"/>
             <a:chExt cx="3240742" cy="3240742"/>
@@ -5612,7 +5270,7 @@
         </p:nvGrpSpPr>
         <p:grpSpPr>
           <a:xfrm>
-            <a:off x="4468905" y="80683"/>
+            <a:off x="4468905" y="107577"/>
             <a:ext cx="3240742" cy="3240742"/>
             <a:chOff x="4468905" y="80683"/>
             <a:chExt cx="3240742" cy="3240742"/>
@@ -5882,6 +5540,93 @@
           </p:spPr>
         </p:pic>
       </p:grpSp>
+      <p:pic>
+        <p:nvPicPr>
+          <p:cNvPr id="5" name="Picture 4"/>
+          <p:cNvPicPr>
+            <a:picLocks noChangeAspect="1"/>
+          </p:cNvPicPr>
+          <p:nvPr/>
+        </p:nvPicPr>
+        <p:blipFill rotWithShape="1">
+          <a:blip r:embed="rId5">
+            <a:extLst>
+              <a:ext uri="{28A0092B-C50C-407E-A947-70E740481C1C}">
+                <a14:useLocalDpi xmlns:a14="http://schemas.microsoft.com/office/drawing/2010/main" val="0"/>
+              </a:ext>
+            </a:extLst>
+          </a:blip>
+          <a:srcRect t="1068"/>
+          <a:stretch/>
+        </p:blipFill>
+        <p:spPr>
+          <a:xfrm>
+            <a:off x="578223" y="3482788"/>
+            <a:ext cx="3267739" cy="3281083"/>
+          </a:xfrm>
+          <a:prstGeom prst="rect">
+            <a:avLst/>
+          </a:prstGeom>
+        </p:spPr>
+      </p:pic>
+      <p:pic>
+        <p:nvPicPr>
+          <p:cNvPr id="6" name="Picture 5"/>
+          <p:cNvPicPr>
+            <a:picLocks noChangeAspect="1"/>
+          </p:cNvPicPr>
+          <p:nvPr/>
+        </p:nvPicPr>
+        <p:blipFill rotWithShape="1">
+          <a:blip r:embed="rId6">
+            <a:extLst>
+              <a:ext uri="{28A0092B-C50C-407E-A947-70E740481C1C}">
+                <a14:useLocalDpi xmlns:a14="http://schemas.microsoft.com/office/drawing/2010/main" val="0"/>
+              </a:ext>
+            </a:extLst>
+          </a:blip>
+          <a:srcRect l="2855" t="1068" r="2726"/>
+          <a:stretch/>
+        </p:blipFill>
+        <p:spPr>
+          <a:xfrm>
+            <a:off x="4450976" y="3482788"/>
+            <a:ext cx="3281083" cy="3281083"/>
+          </a:xfrm>
+          <a:prstGeom prst="rect">
+            <a:avLst/>
+          </a:prstGeom>
+        </p:spPr>
+      </p:pic>
+      <p:pic>
+        <p:nvPicPr>
+          <p:cNvPr id="7" name="Picture 6"/>
+          <p:cNvPicPr>
+            <a:picLocks noChangeAspect="1"/>
+          </p:cNvPicPr>
+          <p:nvPr/>
+        </p:nvPicPr>
+        <p:blipFill rotWithShape="1">
+          <a:blip r:embed="rId7">
+            <a:extLst>
+              <a:ext uri="{28A0092B-C50C-407E-A947-70E740481C1C}">
+                <a14:useLocalDpi xmlns:a14="http://schemas.microsoft.com/office/drawing/2010/main" val="0"/>
+              </a:ext>
+            </a:extLst>
+          </a:blip>
+          <a:srcRect t="1431"/>
+          <a:stretch/>
+        </p:blipFill>
+        <p:spPr>
+          <a:xfrm>
+            <a:off x="8359587" y="3482787"/>
+            <a:ext cx="3273836" cy="3281083"/>
+          </a:xfrm>
+          <a:prstGeom prst="rect">
+            <a:avLst/>
+          </a:prstGeom>
+        </p:spPr>
+      </p:pic>
     </p:spTree>
     <p:extLst>
       <p:ext uri="{BB962C8B-B14F-4D97-AF65-F5344CB8AC3E}">
@@ -5954,7 +5699,23 @@
           <a:lstStyle/>
           <a:p>
             <a:pPr algn="ctr"/>
-            <a:endParaRPr lang="en-US"/>
+            <a:r>
+              <a:rPr lang="en-US" dirty="0" smtClean="0">
+                <a:solidFill>
+                  <a:schemeClr val="bg2">
+                    <a:lumMod val="25000"/>
+                  </a:schemeClr>
+                </a:solidFill>
+              </a:rPr>
+              <a:t>This is a paragraph in 18 point Calibri font. Say hello to the world for me. My program canst say it faster than your program canst. Why am I talking like Shakespeare now? Nobody knows.</a:t>
+            </a:r>
+            <a:endParaRPr lang="en-US" dirty="0">
+              <a:solidFill>
+                <a:schemeClr val="bg2">
+                  <a:lumMod val="25000"/>
+                </a:schemeClr>
+              </a:solidFill>
+            </a:endParaRPr>
           </a:p>
         </p:txBody>
       </p:sp>
@@ -5967,144 +5728,6 @@
         <p:spPr>
           <a:xfrm>
             <a:off x="8359587" y="80683"/>
-            <a:ext cx="3240742" cy="3240742"/>
-          </a:xfrm>
-          <a:prstGeom prst="rect">
-            <a:avLst/>
-          </a:prstGeom>
-          <a:noFill/>
-          <a:ln w="28575">
-            <a:solidFill>
-              <a:srgbClr val="23B4A4"/>
-            </a:solidFill>
-          </a:ln>
-        </p:spPr>
-        <p:style>
-          <a:lnRef idx="2">
-            <a:schemeClr val="accent1">
-              <a:shade val="50000"/>
-            </a:schemeClr>
-          </a:lnRef>
-          <a:fillRef idx="1">
-            <a:schemeClr val="accent1"/>
-          </a:fillRef>
-          <a:effectRef idx="0">
-            <a:schemeClr val="accent1"/>
-          </a:effectRef>
-          <a:fontRef idx="minor">
-            <a:schemeClr val="lt1"/>
-          </a:fontRef>
-        </p:style>
-        <p:txBody>
-          <a:bodyPr rtlCol="0" anchor="ctr"/>
-          <a:lstStyle/>
-          <a:p>
-            <a:pPr algn="ctr"/>
-            <a:endParaRPr lang="en-US"/>
-          </a:p>
-        </p:txBody>
-      </p:sp>
-      <p:sp>
-        <p:nvSpPr>
-          <p:cNvPr id="22" name="Rectangle 21"/>
-          <p:cNvSpPr/>
-          <p:nvPr/>
-        </p:nvSpPr>
-        <p:spPr>
-          <a:xfrm>
-            <a:off x="578223" y="3509683"/>
-            <a:ext cx="3240742" cy="3240742"/>
-          </a:xfrm>
-          <a:prstGeom prst="rect">
-            <a:avLst/>
-          </a:prstGeom>
-          <a:noFill/>
-          <a:ln w="28575">
-            <a:solidFill>
-              <a:srgbClr val="23B4A4"/>
-            </a:solidFill>
-          </a:ln>
-        </p:spPr>
-        <p:style>
-          <a:lnRef idx="2">
-            <a:schemeClr val="accent1">
-              <a:shade val="50000"/>
-            </a:schemeClr>
-          </a:lnRef>
-          <a:fillRef idx="1">
-            <a:schemeClr val="accent1"/>
-          </a:fillRef>
-          <a:effectRef idx="0">
-            <a:schemeClr val="accent1"/>
-          </a:effectRef>
-          <a:fontRef idx="minor">
-            <a:schemeClr val="lt1"/>
-          </a:fontRef>
-        </p:style>
-        <p:txBody>
-          <a:bodyPr rtlCol="0" anchor="ctr"/>
-          <a:lstStyle/>
-          <a:p>
-            <a:pPr algn="ctr"/>
-            <a:endParaRPr lang="en-US"/>
-          </a:p>
-        </p:txBody>
-      </p:sp>
-      <p:sp>
-        <p:nvSpPr>
-          <p:cNvPr id="23" name="Rectangle 22"/>
-          <p:cNvSpPr/>
-          <p:nvPr/>
-        </p:nvSpPr>
-        <p:spPr>
-          <a:xfrm>
-            <a:off x="4468905" y="3509683"/>
-            <a:ext cx="3240742" cy="3240742"/>
-          </a:xfrm>
-          <a:prstGeom prst="rect">
-            <a:avLst/>
-          </a:prstGeom>
-          <a:noFill/>
-          <a:ln w="28575">
-            <a:solidFill>
-              <a:srgbClr val="23B4A4"/>
-            </a:solidFill>
-          </a:ln>
-        </p:spPr>
-        <p:style>
-          <a:lnRef idx="2">
-            <a:schemeClr val="accent1">
-              <a:shade val="50000"/>
-            </a:schemeClr>
-          </a:lnRef>
-          <a:fillRef idx="1">
-            <a:schemeClr val="accent1"/>
-          </a:fillRef>
-          <a:effectRef idx="0">
-            <a:schemeClr val="accent1"/>
-          </a:effectRef>
-          <a:fontRef idx="minor">
-            <a:schemeClr val="lt1"/>
-          </a:fontRef>
-        </p:style>
-        <p:txBody>
-          <a:bodyPr rtlCol="0" anchor="ctr"/>
-          <a:lstStyle/>
-          <a:p>
-            <a:pPr algn="ctr"/>
-            <a:endParaRPr lang="en-US"/>
-          </a:p>
-        </p:txBody>
-      </p:sp>
-      <p:sp>
-        <p:nvSpPr>
-          <p:cNvPr id="24" name="Rectangle 23"/>
-          <p:cNvSpPr/>
-          <p:nvPr/>
-        </p:nvSpPr>
-        <p:spPr>
-          <a:xfrm>
-            <a:off x="8359587" y="3509683"/>
             <a:ext cx="3240742" cy="3240742"/>
           </a:xfrm>
           <a:prstGeom prst="rect">
@@ -6281,6 +5904,35 @@
           </p:spPr>
         </p:pic>
       </p:grpSp>
+      <p:pic>
+        <p:nvPicPr>
+          <p:cNvPr id="3" name="Picture 2"/>
+          <p:cNvPicPr>
+            <a:picLocks noChangeAspect="1"/>
+          </p:cNvPicPr>
+          <p:nvPr/>
+        </p:nvPicPr>
+        <p:blipFill rotWithShape="1">
+          <a:blip r:embed="rId3">
+            <a:extLst>
+              <a:ext uri="{28A0092B-C50C-407E-A947-70E740481C1C}">
+                <a14:useLocalDpi xmlns:a14="http://schemas.microsoft.com/office/drawing/2010/main" val="0"/>
+              </a:ext>
+            </a:extLst>
+          </a:blip>
+          <a:srcRect t="1217"/>
+          <a:stretch/>
+        </p:blipFill>
+        <p:spPr>
+          <a:xfrm>
+            <a:off x="578223" y="3455894"/>
+            <a:ext cx="3267739" cy="3276171"/>
+          </a:xfrm>
+          <a:prstGeom prst="rect">
+            <a:avLst/>
+          </a:prstGeom>
+        </p:spPr>
+      </p:pic>
     </p:spTree>
     <p:extLst>
       <p:ext uri="{BB962C8B-B14F-4D97-AF65-F5344CB8AC3E}">

</xml_diff>